<commit_message>
Newest version of presentation
</commit_message>
<xml_diff>
--- a/ch.bfh.bti7081.s2013.green/doc/task7/Task7_Präsentation.pptx
+++ b/ch.bfh.bti7081.s2013.green/doc/task7/Task7_Präsentation.pptx
@@ -9,10 +9,9 @@
     <p:sldId id="278" r:id="rId3"/>
     <p:sldId id="280" r:id="rId4"/>
     <p:sldId id="275" r:id="rId5"/>
-    <p:sldId id="281" r:id="rId6"/>
+    <p:sldId id="277" r:id="rId6"/>
     <p:sldId id="279" r:id="rId7"/>
-    <p:sldId id="277" r:id="rId8"/>
-    <p:sldId id="276" r:id="rId9"/>
+    <p:sldId id="276" r:id="rId8"/>
   </p:sldIdLst>
   <p:sldSz cx="12192000" cy="6858000"/>
   <p:notesSz cx="6858000" cy="9144000"/>
@@ -6451,184 +6450,13 @@
           <a:p>
             <a:r>
               <a:rPr lang="de-CH" dirty="0" smtClean="0"/>
-              <a:t>MVC Prinzip angenommen (wobei in der Realisierung dann auf die Frameworks </a:t>
-            </a:r>
-            <a:r>
-              <a:rPr lang="de-CH" dirty="0" err="1" smtClean="0"/>
-              <a:t>bsp.</a:t>
+              <a:t>MVC Prinzip </a:t>
             </a:r>
             <a:r>
               <a:rPr lang="de-CH" dirty="0" smtClean="0"/>
-              <a:t> Von Android zurückgegriffen wird /</a:t>
-            </a:r>
-            <a:r>
-              <a:rPr lang="de-CH" dirty="0" err="1" smtClean="0"/>
-              <a:t>Activitys</a:t>
-            </a:r>
-            <a:r>
-              <a:rPr lang="de-CH" dirty="0" smtClean="0"/>
-              <a:t>, Services etc.</a:t>
-            </a:r>
-          </a:p>
-          <a:p>
-            <a:r>
-              <a:rPr lang="de-CH" dirty="0" smtClean="0">
-                <a:solidFill>
-                  <a:srgbClr val="FF0000"/>
-                </a:solidFill>
-              </a:rPr>
-              <a:t>«Aus unserer Sicht macht die gewünschte Detaillierung mit den </a:t>
-            </a:r>
-            <a:r>
-              <a:rPr lang="de-CH" dirty="0" err="1" smtClean="0">
-                <a:solidFill>
-                  <a:srgbClr val="FF0000"/>
-                </a:solidFill>
-              </a:rPr>
-              <a:t>CRCards</a:t>
-            </a:r>
-            <a:r>
-              <a:rPr lang="de-CH" dirty="0" smtClean="0">
-                <a:solidFill>
-                  <a:srgbClr val="FF0000"/>
-                </a:solidFill>
-              </a:rPr>
-              <a:t> ohne Framework entscheid keinen Sinn. Zudem Fragen wir uns wie sich der Aufwand in der Praxis rechtfertigen lässt / zudem veralten die CRC Cards recht schnell» </a:t>
-            </a:r>
-            <a:r>
-              <a:rPr lang="de-CH" dirty="0" err="1" smtClean="0">
-                <a:solidFill>
-                  <a:srgbClr val="FF0000"/>
-                </a:solidFill>
-              </a:rPr>
-              <a:t>müesse</a:t>
-            </a:r>
-            <a:r>
-              <a:rPr lang="de-CH" dirty="0" smtClean="0">
-                <a:solidFill>
-                  <a:srgbClr val="FF0000"/>
-                </a:solidFill>
-              </a:rPr>
-              <a:t> </a:t>
-            </a:r>
-            <a:r>
-              <a:rPr lang="de-CH" dirty="0" err="1" smtClean="0">
-                <a:solidFill>
-                  <a:srgbClr val="FF0000"/>
-                </a:solidFill>
-              </a:rPr>
-              <a:t>mr</a:t>
-            </a:r>
-            <a:r>
-              <a:rPr lang="de-CH" dirty="0" smtClean="0">
-                <a:solidFill>
-                  <a:srgbClr val="FF0000"/>
-                </a:solidFill>
-              </a:rPr>
-              <a:t> </a:t>
-            </a:r>
-            <a:r>
-              <a:rPr lang="de-CH" dirty="0" err="1" smtClean="0">
-                <a:solidFill>
-                  <a:srgbClr val="FF0000"/>
-                </a:solidFill>
-              </a:rPr>
-              <a:t>no</a:t>
-            </a:r>
-            <a:r>
-              <a:rPr lang="de-CH" dirty="0" smtClean="0">
-                <a:solidFill>
-                  <a:srgbClr val="FF0000"/>
-                </a:solidFill>
-              </a:rPr>
-              <a:t> </a:t>
-            </a:r>
-            <a:r>
-              <a:rPr lang="de-CH" dirty="0" err="1" smtClean="0">
-                <a:solidFill>
-                  <a:srgbClr val="FF0000"/>
-                </a:solidFill>
-              </a:rPr>
-              <a:t>luege</a:t>
-            </a:r>
-            <a:r>
-              <a:rPr lang="de-CH" dirty="0" smtClean="0">
-                <a:solidFill>
-                  <a:srgbClr val="FF0000"/>
-                </a:solidFill>
-              </a:rPr>
-              <a:t> </a:t>
-            </a:r>
-            <a:r>
-              <a:rPr lang="de-CH" dirty="0" err="1" smtClean="0">
-                <a:solidFill>
-                  <a:srgbClr val="FF0000"/>
-                </a:solidFill>
-              </a:rPr>
-              <a:t>öb</a:t>
-            </a:r>
-            <a:r>
-              <a:rPr lang="de-CH" dirty="0" smtClean="0">
-                <a:solidFill>
-                  <a:srgbClr val="FF0000"/>
-                </a:solidFill>
-              </a:rPr>
-              <a:t> </a:t>
-            </a:r>
-            <a:r>
-              <a:rPr lang="de-CH" dirty="0" err="1" smtClean="0">
-                <a:solidFill>
-                  <a:srgbClr val="FF0000"/>
-                </a:solidFill>
-              </a:rPr>
-              <a:t>mr</a:t>
-            </a:r>
-            <a:r>
-              <a:rPr lang="de-CH" dirty="0" smtClean="0">
-                <a:solidFill>
-                  <a:srgbClr val="FF0000"/>
-                </a:solidFill>
-              </a:rPr>
-              <a:t> </a:t>
-            </a:r>
-            <a:r>
-              <a:rPr lang="de-CH" dirty="0" err="1" smtClean="0">
-                <a:solidFill>
-                  <a:srgbClr val="FF0000"/>
-                </a:solidFill>
-              </a:rPr>
-              <a:t>dä</a:t>
-            </a:r>
-            <a:r>
-              <a:rPr lang="de-CH" dirty="0" smtClean="0">
-                <a:solidFill>
-                  <a:srgbClr val="FF0000"/>
-                </a:solidFill>
-              </a:rPr>
-              <a:t> </a:t>
-            </a:r>
-            <a:r>
-              <a:rPr lang="de-CH" dirty="0" err="1" smtClean="0">
-                <a:solidFill>
-                  <a:srgbClr val="FF0000"/>
-                </a:solidFill>
-              </a:rPr>
-              <a:t>inenä</a:t>
-            </a:r>
-            <a:r>
-              <a:rPr lang="de-CH" dirty="0" smtClean="0">
-                <a:solidFill>
-                  <a:srgbClr val="FF0000"/>
-                </a:solidFill>
-                <a:sym typeface="Wingdings" panose="05000000000000000000" pitchFamily="2" charset="2"/>
-              </a:rPr>
-              <a:t></a:t>
-            </a:r>
-            <a:endParaRPr lang="de-CH" dirty="0">
-              <a:solidFill>
-                <a:srgbClr val="FF0000"/>
-              </a:solidFill>
-            </a:endParaRPr>
+              <a:t>gewählt</a:t>
+            </a:r>
+            <a:endParaRPr lang="de-CH" dirty="0" smtClean="0"/>
           </a:p>
         </p:txBody>
       </p:sp>
@@ -6725,13 +6553,13 @@
               </a:ext>
             </a:extLst>
           </a:blip>
-          <a:srcRect l="22255" t="19225" r="1070" b="18760"/>
+          <a:srcRect l="22255" t="19499" r="1707" b="18760"/>
           <a:stretch/>
         </p:blipFill>
         <p:spPr bwMode="auto">
           <a:xfrm>
-            <a:off x="0" y="1392381"/>
-            <a:ext cx="10140613" cy="4613563"/>
+            <a:off x="1" y="1412776"/>
+            <a:ext cx="10056440" cy="4593168"/>
           </a:xfrm>
           <a:prstGeom prst="rect">
             <a:avLst/>
@@ -6819,7 +6647,7 @@
             </a:r>
             <a:r>
               <a:rPr lang="en-GB" dirty="0" err="1" smtClean="0"/>
-              <a:t>Dokument</a:t>
+              <a:t>Serverkommunikation</a:t>
             </a:r>
             <a:endParaRPr lang="en-GB" dirty="0"/>
           </a:p>
@@ -6834,14 +6662,14 @@
           <p:nvPr>
             <p:extLst>
               <p:ext uri="{D42A27DB-BD31-4B8C-83A1-F6EECF244321}">
-                <p14:modId xmlns:p14="http://schemas.microsoft.com/office/powerpoint/2010/main" val="3785805837"/>
+                <p14:modId xmlns:p14="http://schemas.microsoft.com/office/powerpoint/2010/main" val="181945957"/>
               </p:ext>
             </p:extLst>
           </p:nvPr>
         </p:nvGraphicFramePr>
         <p:xfrm>
           <a:off x="2051050" y="3910965"/>
-          <a:ext cx="5849620" cy="1927860"/>
+          <a:ext cx="5849620" cy="2120646"/>
         </p:xfrm>
         <a:graphic>
           <a:graphicData uri="http://schemas.openxmlformats.org/drawingml/2006/table">
@@ -6868,12 +6696,18 @@
                         </a:spcAft>
                       </a:pPr>
                       <a:r>
-                        <a:rPr lang="de-CH" sz="1100">
+                        <a:rPr lang="de-CH" sz="1100" dirty="0" err="1">
                           <a:effectLst/>
                         </a:rPr>
-                        <a:t>Responsibilities: </a:t>
+                        <a:t>Responsibilities</a:t>
                       </a:r>
-                      <a:endParaRPr lang="de-CH" sz="1100">
+                      <a:r>
+                        <a:rPr lang="de-CH" sz="1100" dirty="0">
+                          <a:effectLst/>
+                        </a:rPr>
+                        <a:t>: </a:t>
+                      </a:r>
+                      <a:endParaRPr lang="de-CH" sz="1100" dirty="0">
                         <a:effectLst/>
                         <a:latin typeface="Calibri"/>
                         <a:ea typeface="Calibri"/>
@@ -6897,12 +6731,18 @@
                         </a:spcAft>
                       </a:pPr>
                       <a:r>
-                        <a:rPr lang="de-CH" sz="1100">
+                        <a:rPr lang="de-CH" sz="1100" dirty="0" err="1">
                           <a:effectLst/>
                         </a:rPr>
-                        <a:t>Collaborations: </a:t>
+                        <a:t>Collaborations</a:t>
                       </a:r>
-                      <a:endParaRPr lang="de-CH" sz="1100">
+                      <a:r>
+                        <a:rPr lang="de-CH" sz="1100" dirty="0">
+                          <a:effectLst/>
+                        </a:rPr>
+                        <a:t>: </a:t>
+                      </a:r>
+                      <a:endParaRPr lang="de-CH" sz="1100" dirty="0">
                         <a:effectLst/>
                         <a:latin typeface="Calibri"/>
                         <a:ea typeface="Calibri"/>
@@ -6928,17 +6768,182 @@
                         </a:spcAft>
                       </a:pPr>
                       <a:r>
+                        <a:rPr lang="de-CH" sz="1100" dirty="0">
+                          <a:effectLst/>
+                          <a:latin typeface="+mn-lt"/>
+                          <a:ea typeface="Calibri"/>
+                          <a:cs typeface="Times New Roman"/>
+                        </a:rPr>
+                        <a:t>Erstellt Anfragen</a:t>
+                      </a:r>
+                    </a:p>
+                  </a:txBody>
+                  <a:tcPr marL="68580" marR="68580" marT="0" marB="0"/>
+                </a:tc>
+                <a:tc>
+                  <a:txBody>
+                    <a:bodyPr/>
+                    <a:lstStyle/>
+                    <a:p>
+                      <a:pPr>
+                        <a:lnSpc>
+                          <a:spcPct val="115000"/>
+                        </a:lnSpc>
+                        <a:spcAft>
+                          <a:spcPts val="0"/>
+                        </a:spcAft>
+                      </a:pPr>
+                      <a:r>
+                        <a:rPr lang="de-CH" sz="1100" dirty="0">
+                          <a:effectLst/>
+                          <a:latin typeface="+mn-lt"/>
+                          <a:ea typeface="Calibri"/>
+                          <a:cs typeface="Times New Roman"/>
+                        </a:rPr>
+                        <a:t>Patient</a:t>
+                      </a:r>
+                    </a:p>
+                  </a:txBody>
+                  <a:tcPr marL="68580" marR="68580" marT="0" marB="0"/>
+                </a:tc>
+              </a:tr>
+              <a:tr h="0">
+                <a:tc>
+                  <a:txBody>
+                    <a:bodyPr/>
+                    <a:lstStyle/>
+                    <a:p>
+                      <a:pPr>
+                        <a:lnSpc>
+                          <a:spcPct val="115000"/>
+                        </a:lnSpc>
+                        <a:spcAft>
+                          <a:spcPts val="0"/>
+                        </a:spcAft>
+                      </a:pPr>
+                      <a:r>
                         <a:rPr lang="de-CH" sz="1100">
                           <a:effectLst/>
+                          <a:latin typeface="+mn-lt"/>
+                          <a:ea typeface="Calibri"/>
+                          <a:cs typeface="Times New Roman"/>
                         </a:rPr>
-                        <a:t>Kennt Dokument Eigenschaften</a:t>
+                        <a:t>Sendet Anfragen</a:t>
                       </a:r>
-                      <a:endParaRPr lang="de-CH" sz="1100">
+                    </a:p>
+                  </a:txBody>
+                  <a:tcPr marL="68580" marR="68580" marT="0" marB="0"/>
+                </a:tc>
+                <a:tc>
+                  <a:txBody>
+                    <a:bodyPr/>
+                    <a:lstStyle/>
+                    <a:p>
+                      <a:pPr>
+                        <a:lnSpc>
+                          <a:spcPct val="115000"/>
+                        </a:lnSpc>
+                        <a:spcAft>
+                          <a:spcPts val="0"/>
+                        </a:spcAft>
+                      </a:pPr>
+                      <a:r>
+                        <a:rPr lang="de-CH" sz="1100">
+                          <a:effectLst/>
+                          <a:latin typeface="+mn-lt"/>
+                          <a:ea typeface="Calibri"/>
+                          <a:cs typeface="Times New Roman"/>
+                        </a:rPr>
+                        <a:t>DetailControl</a:t>
+                      </a:r>
+                    </a:p>
+                  </a:txBody>
+                  <a:tcPr marL="68580" marR="68580" marT="0" marB="0"/>
+                </a:tc>
+              </a:tr>
+              <a:tr h="0">
+                <a:tc>
+                  <a:txBody>
+                    <a:bodyPr/>
+                    <a:lstStyle/>
+                    <a:p>
+                      <a:pPr>
+                        <a:lnSpc>
+                          <a:spcPct val="115000"/>
+                        </a:lnSpc>
+                        <a:spcAft>
+                          <a:spcPts val="0"/>
+                        </a:spcAft>
+                      </a:pPr>
+                      <a:r>
+                        <a:rPr lang="de-CH" sz="1100">
+                          <a:effectLst/>
+                          <a:latin typeface="+mn-lt"/>
+                          <a:ea typeface="Calibri"/>
+                          <a:cs typeface="Times New Roman"/>
+                        </a:rPr>
+                        <a:t>Empfängt Antworten</a:t>
+                      </a:r>
+                    </a:p>
+                  </a:txBody>
+                  <a:tcPr marL="68580" marR="68580" marT="0" marB="0"/>
+                </a:tc>
+                <a:tc>
+                  <a:txBody>
+                    <a:bodyPr/>
+                    <a:lstStyle/>
+                    <a:p>
+                      <a:pPr>
+                        <a:lnSpc>
+                          <a:spcPct val="115000"/>
+                        </a:lnSpc>
+                        <a:spcAft>
+                          <a:spcPts val="0"/>
+                        </a:spcAft>
+                      </a:pPr>
+                      <a:r>
+                        <a:rPr lang="de-CH" sz="1100" dirty="0" err="1" smtClean="0">
+                          <a:effectLst/>
+                          <a:latin typeface="+mn-lt"/>
+                          <a:ea typeface="Calibri"/>
+                          <a:cs typeface="Times New Roman"/>
+                        </a:rPr>
+                        <a:t>TerminEintragControl</a:t>
+                      </a:r>
+                      <a:endParaRPr lang="de-CH" sz="1100" dirty="0">
                         <a:effectLst/>
-                        <a:latin typeface="Calibri"/>
+                        <a:latin typeface="+mn-lt"/>
                         <a:ea typeface="Calibri"/>
                         <a:cs typeface="Times New Roman"/>
                       </a:endParaRPr>
+                    </a:p>
+                  </a:txBody>
+                  <a:tcPr marL="68580" marR="68580" marT="0" marB="0"/>
+                </a:tc>
+              </a:tr>
+              <a:tr h="0">
+                <a:tc>
+                  <a:txBody>
+                    <a:bodyPr/>
+                    <a:lstStyle/>
+                    <a:p>
+                      <a:pPr>
+                        <a:lnSpc>
+                          <a:spcPct val="115000"/>
+                        </a:lnSpc>
+                        <a:spcAft>
+                          <a:spcPts val="0"/>
+                        </a:spcAft>
+                      </a:pPr>
+                      <a:r>
+                        <a:rPr lang="de-CH" sz="1100">
+                          <a:effectLst/>
+                          <a:latin typeface="+mn-lt"/>
+                          <a:ea typeface="Calibri"/>
+                          <a:cs typeface="Times New Roman"/>
+                        </a:rPr>
+                        <a:t>Stellt Antworten anderen Klassen zur Verfügung</a:t>
+                      </a:r>
                     </a:p>
                   </a:txBody>
                   <a:tcPr marL="68580" marR="68580" marT="0" marB="0"/>
@@ -6988,17 +6993,14 @@
                         </a:spcAft>
                       </a:pPr>
                       <a:r>
-                        <a:rPr lang="de-CH" sz="1100">
+                        <a:rPr lang="de-CH" sz="1100" dirty="0">
                           <a:effectLst/>
+                          <a:latin typeface="+mn-lt"/>
+                          <a:ea typeface="Calibri"/>
+                          <a:cs typeface="Times New Roman"/>
                         </a:rPr>
-                        <a:t> </a:t>
+                        <a:t>Kennt Applikationsserver</a:t>
                       </a:r>
-                      <a:endParaRPr lang="de-CH" sz="1100">
-                        <a:effectLst/>
-                        <a:latin typeface="Calibri"/>
-                        <a:ea typeface="Calibri"/>
-                        <a:cs typeface="Times New Roman"/>
-                      </a:endParaRPr>
                     </a:p>
                   </a:txBody>
                   <a:tcPr marL="68580" marR="68580" marT="0" marB="0"/>
@@ -7048,192 +7050,12 @@
                         </a:spcAft>
                       </a:pPr>
                       <a:r>
-                        <a:rPr lang="de-CH" sz="1100">
+                        <a:rPr lang="de-CH" sz="1100" dirty="0">
                           <a:effectLst/>
                         </a:rPr>
                         <a:t> </a:t>
                       </a:r>
-                      <a:endParaRPr lang="de-CH" sz="1100">
-                        <a:effectLst/>
-                        <a:latin typeface="Calibri"/>
-                        <a:ea typeface="Calibri"/>
-                        <a:cs typeface="Times New Roman"/>
-                      </a:endParaRPr>
-                    </a:p>
-                  </a:txBody>
-                  <a:tcPr marL="68580" marR="68580" marT="0" marB="0"/>
-                </a:tc>
-                <a:tc>
-                  <a:txBody>
-                    <a:bodyPr/>
-                    <a:lstStyle/>
-                    <a:p>
-                      <a:pPr>
-                        <a:lnSpc>
-                          <a:spcPct val="115000"/>
-                        </a:lnSpc>
-                        <a:spcAft>
-                          <a:spcPts val="0"/>
-                        </a:spcAft>
-                      </a:pPr>
-                      <a:r>
-                        <a:rPr lang="de-CH" sz="1100">
-                          <a:effectLst/>
-                        </a:rPr>
-                        <a:t> </a:t>
-                      </a:r>
-                      <a:endParaRPr lang="de-CH" sz="1100">
-                        <a:effectLst/>
-                        <a:latin typeface="Calibri"/>
-                        <a:ea typeface="Calibri"/>
-                        <a:cs typeface="Times New Roman"/>
-                      </a:endParaRPr>
-                    </a:p>
-                  </a:txBody>
-                  <a:tcPr marL="68580" marR="68580" marT="0" marB="0"/>
-                </a:tc>
-              </a:tr>
-              <a:tr h="0">
-                <a:tc>
-                  <a:txBody>
-                    <a:bodyPr/>
-                    <a:lstStyle/>
-                    <a:p>
-                      <a:pPr>
-                        <a:lnSpc>
-                          <a:spcPct val="115000"/>
-                        </a:lnSpc>
-                        <a:spcAft>
-                          <a:spcPts val="0"/>
-                        </a:spcAft>
-                      </a:pPr>
-                      <a:r>
-                        <a:rPr lang="de-CH" sz="1100">
-                          <a:effectLst/>
-                        </a:rPr>
-                        <a:t> </a:t>
-                      </a:r>
-                      <a:endParaRPr lang="de-CH" sz="1100">
-                        <a:effectLst/>
-                        <a:latin typeface="Calibri"/>
-                        <a:ea typeface="Calibri"/>
-                        <a:cs typeface="Times New Roman"/>
-                      </a:endParaRPr>
-                    </a:p>
-                  </a:txBody>
-                  <a:tcPr marL="68580" marR="68580" marT="0" marB="0"/>
-                </a:tc>
-                <a:tc>
-                  <a:txBody>
-                    <a:bodyPr/>
-                    <a:lstStyle/>
-                    <a:p>
-                      <a:pPr>
-                        <a:lnSpc>
-                          <a:spcPct val="115000"/>
-                        </a:lnSpc>
-                        <a:spcAft>
-                          <a:spcPts val="0"/>
-                        </a:spcAft>
-                      </a:pPr>
-                      <a:r>
-                        <a:rPr lang="de-CH" sz="1100">
-                          <a:effectLst/>
-                        </a:rPr>
-                        <a:t> </a:t>
-                      </a:r>
-                      <a:endParaRPr lang="de-CH" sz="1100">
-                        <a:effectLst/>
-                        <a:latin typeface="Calibri"/>
-                        <a:ea typeface="Calibri"/>
-                        <a:cs typeface="Times New Roman"/>
-                      </a:endParaRPr>
-                    </a:p>
-                  </a:txBody>
-                  <a:tcPr marL="68580" marR="68580" marT="0" marB="0"/>
-                </a:tc>
-              </a:tr>
-              <a:tr h="0">
-                <a:tc>
-                  <a:txBody>
-                    <a:bodyPr/>
-                    <a:lstStyle/>
-                    <a:p>
-                      <a:pPr>
-                        <a:lnSpc>
-                          <a:spcPct val="115000"/>
-                        </a:lnSpc>
-                        <a:spcAft>
-                          <a:spcPts val="0"/>
-                        </a:spcAft>
-                      </a:pPr>
-                      <a:r>
-                        <a:rPr lang="de-CH" sz="1100">
-                          <a:effectLst/>
-                        </a:rPr>
-                        <a:t> </a:t>
-                      </a:r>
-                      <a:endParaRPr lang="de-CH" sz="1100">
-                        <a:effectLst/>
-                        <a:latin typeface="Calibri"/>
-                        <a:ea typeface="Calibri"/>
-                        <a:cs typeface="Times New Roman"/>
-                      </a:endParaRPr>
-                    </a:p>
-                  </a:txBody>
-                  <a:tcPr marL="68580" marR="68580" marT="0" marB="0"/>
-                </a:tc>
-                <a:tc>
-                  <a:txBody>
-                    <a:bodyPr/>
-                    <a:lstStyle/>
-                    <a:p>
-                      <a:pPr>
-                        <a:lnSpc>
-                          <a:spcPct val="115000"/>
-                        </a:lnSpc>
-                        <a:spcAft>
-                          <a:spcPts val="0"/>
-                        </a:spcAft>
-                      </a:pPr>
-                      <a:r>
-                        <a:rPr lang="de-CH" sz="1100">
-                          <a:effectLst/>
-                        </a:rPr>
-                        <a:t> </a:t>
-                      </a:r>
-                      <a:endParaRPr lang="de-CH" sz="1100">
-                        <a:effectLst/>
-                        <a:latin typeface="Calibri"/>
-                        <a:ea typeface="Calibri"/>
-                        <a:cs typeface="Times New Roman"/>
-                      </a:endParaRPr>
-                    </a:p>
-                  </a:txBody>
-                  <a:tcPr marL="68580" marR="68580" marT="0" marB="0"/>
-                </a:tc>
-              </a:tr>
-              <a:tr h="0">
-                <a:tc>
-                  <a:txBody>
-                    <a:bodyPr/>
-                    <a:lstStyle/>
-                    <a:p>
-                      <a:pPr>
-                        <a:lnSpc>
-                          <a:spcPct val="115000"/>
-                        </a:lnSpc>
-                        <a:spcAft>
-                          <a:spcPts val="0"/>
-                        </a:spcAft>
-                      </a:pPr>
-                      <a:r>
-                        <a:rPr lang="de-CH" sz="1100">
-                          <a:effectLst/>
-                        </a:rPr>
-                        <a:t> </a:t>
-                      </a:r>
-                      <a:endParaRPr lang="de-CH" sz="1100">
+                      <a:endParaRPr lang="de-CH" sz="1100" dirty="0">
                         <a:effectLst/>
                         <a:latin typeface="Calibri"/>
                         <a:ea typeface="Calibri"/>
@@ -7467,8 +7289,8 @@
         </p:nvSpPr>
         <p:spPr bwMode="auto">
           <a:xfrm>
-            <a:off x="2051050" y="3136900"/>
-            <a:ext cx="12192000" cy="457200"/>
+            <a:off x="2051050" y="2980779"/>
+            <a:ext cx="7920758" cy="769441"/>
           </a:xfrm>
           <a:prstGeom prst="rect">
             <a:avLst/>
@@ -7533,7 +7355,7 @@
               <a:tabLst/>
             </a:pPr>
             <a:r>
-              <a:rPr kumimoji="0" lang="en-US" sz="1100" b="0" i="0" u="none" strike="noStrike" cap="none" normalizeH="0" baseline="0" smtClean="0">
+              <a:rPr kumimoji="0" lang="en-US" sz="1100" b="0" i="0" u="none" strike="noStrike" cap="none" normalizeH="0" baseline="0" dirty="0" smtClean="0">
                 <a:ln>
                   <a:noFill/>
                 </a:ln>
@@ -7545,9 +7367,24 @@
                 <a:ea typeface="Calibri" pitchFamily="34" charset="0"/>
                 <a:cs typeface="Times New Roman" pitchFamily="18" charset="0"/>
               </a:rPr>
-              <a:t>Working Name:		Dokument</a:t>
-            </a:r>
-            <a:endParaRPr kumimoji="0" lang="de-CH" sz="900" b="0" i="0" u="none" strike="noStrike" cap="none" normalizeH="0" baseline="0" smtClean="0">
+              <a:t>Working Name:		</a:t>
+            </a:r>
+            <a:r>
+              <a:rPr kumimoji="0" lang="en-US" sz="1100" b="0" i="0" u="none" strike="noStrike" cap="none" normalizeH="0" baseline="0" dirty="0" err="1" smtClean="0">
+                <a:ln>
+                  <a:noFill/>
+                </a:ln>
+                <a:solidFill>
+                  <a:schemeClr val="tx1"/>
+                </a:solidFill>
+                <a:effectLst/>
+                <a:latin typeface="Calibri" pitchFamily="34" charset="0"/>
+                <a:ea typeface="Calibri" pitchFamily="34" charset="0"/>
+                <a:cs typeface="Times New Roman" pitchFamily="18" charset="0"/>
+              </a:rPr>
+              <a:t>ServerKommunikation</a:t>
+            </a:r>
+            <a:endParaRPr kumimoji="0" lang="de-CH" sz="900" b="0" i="0" u="none" strike="noStrike" cap="none" normalizeH="0" baseline="0" dirty="0" smtClean="0">
               <a:ln>
                 <a:noFill/>
               </a:ln>
@@ -7577,7 +7414,7 @@
               <a:tabLst/>
             </a:pPr>
             <a:r>
-              <a:rPr kumimoji="0" lang="en-US" sz="1100" b="0" i="0" u="none" strike="noStrike" cap="none" normalizeH="0" baseline="0" smtClean="0">
+              <a:rPr kumimoji="0" lang="en-US" sz="1100" b="0" i="0" u="none" strike="noStrike" cap="none" normalizeH="0" baseline="0" dirty="0" smtClean="0">
                 <a:ln>
                   <a:noFill/>
                 </a:ln>
@@ -7591,7 +7428,67 @@
               </a:rPr>
               <a:t>Possible Names:	</a:t>
             </a:r>
-            <a:endParaRPr kumimoji="0" lang="de-CH" sz="900" b="0" i="0" u="none" strike="noStrike" cap="none" normalizeH="0" baseline="0" smtClean="0">
+            <a:r>
+              <a:rPr kumimoji="0" lang="en-US" sz="1100" b="0" i="0" u="none" strike="noStrike" cap="none" normalizeH="0" baseline="0" dirty="0" err="1" smtClean="0">
+                <a:ln>
+                  <a:noFill/>
+                </a:ln>
+                <a:solidFill>
+                  <a:schemeClr val="tx1"/>
+                </a:solidFill>
+                <a:effectLst/>
+                <a:latin typeface="Calibri" pitchFamily="34" charset="0"/>
+                <a:ea typeface="Calibri" pitchFamily="34" charset="0"/>
+                <a:cs typeface="Times New Roman" pitchFamily="18" charset="0"/>
+              </a:rPr>
+              <a:t>ServerHelper</a:t>
+            </a:r>
+            <a:r>
+              <a:rPr kumimoji="0" lang="en-US" sz="1100" b="0" i="0" u="none" strike="noStrike" cap="none" normalizeH="0" baseline="0" dirty="0" smtClean="0">
+                <a:ln>
+                  <a:noFill/>
+                </a:ln>
+                <a:solidFill>
+                  <a:schemeClr val="tx1"/>
+                </a:solidFill>
+                <a:effectLst/>
+                <a:latin typeface="Calibri" pitchFamily="34" charset="0"/>
+                <a:ea typeface="Calibri" pitchFamily="34" charset="0"/>
+                <a:cs typeface="Times New Roman" pitchFamily="18" charset="0"/>
+              </a:rPr>
+              <a:t>,</a:t>
+            </a:r>
+            <a:r>
+              <a:rPr kumimoji="0" lang="en-US" sz="1100" b="0" i="0" u="none" strike="noStrike" cap="none" normalizeH="0" dirty="0" smtClean="0">
+                <a:ln>
+                  <a:noFill/>
+                </a:ln>
+                <a:solidFill>
+                  <a:schemeClr val="tx1"/>
+                </a:solidFill>
+                <a:effectLst/>
+                <a:latin typeface="Calibri" pitchFamily="34" charset="0"/>
+                <a:ea typeface="Calibri" pitchFamily="34" charset="0"/>
+                <a:cs typeface="Times New Roman" pitchFamily="18" charset="0"/>
+              </a:rPr>
+              <a:t> </a:t>
+            </a:r>
+            <a:r>
+              <a:rPr kumimoji="0" lang="en-US" sz="1100" b="0" i="0" u="none" strike="noStrike" cap="none" normalizeH="0" dirty="0" err="1" smtClean="0">
+                <a:ln>
+                  <a:noFill/>
+                </a:ln>
+                <a:solidFill>
+                  <a:schemeClr val="tx1"/>
+                </a:solidFill>
+                <a:effectLst/>
+                <a:latin typeface="Calibri" pitchFamily="34" charset="0"/>
+                <a:ea typeface="Calibri" pitchFamily="34" charset="0"/>
+                <a:cs typeface="Times New Roman" pitchFamily="18" charset="0"/>
+              </a:rPr>
+              <a:t>CommunicationHelper</a:t>
+            </a:r>
+            <a:endParaRPr kumimoji="0" lang="de-CH" sz="900" b="0" i="0" u="none" strike="noStrike" cap="none" normalizeH="0" baseline="0" dirty="0" smtClean="0">
               <a:ln>
                 <a:noFill/>
               </a:ln>
@@ -7621,7 +7518,7 @@
               <a:tabLst/>
             </a:pPr>
             <a:r>
-              <a:rPr kumimoji="0" lang="en-US" sz="1100" b="0" i="0" u="none" strike="noStrike" cap="none" normalizeH="0" baseline="0" smtClean="0">
+              <a:rPr kumimoji="0" lang="en-US" sz="1100" b="0" i="0" u="none" strike="noStrike" cap="none" normalizeH="0" baseline="0" dirty="0" err="1" smtClean="0">
                 <a:ln>
                   <a:noFill/>
                 </a:ln>
@@ -7633,9 +7530,24 @@
                 <a:ea typeface="Calibri" pitchFamily="34" charset="0"/>
                 <a:cs typeface="Times New Roman" pitchFamily="18" charset="0"/>
               </a:rPr>
-              <a:t>Effecitve Name: 	</a:t>
-            </a:r>
-            <a:endParaRPr kumimoji="0" lang="de-CH" sz="900" b="0" i="0" u="none" strike="noStrike" cap="none" normalizeH="0" baseline="0" smtClean="0">
+              <a:t>Effecitve</a:t>
+            </a:r>
+            <a:r>
+              <a:rPr kumimoji="0" lang="en-US" sz="1100" b="0" i="0" u="none" strike="noStrike" cap="none" normalizeH="0" baseline="0" dirty="0" smtClean="0">
+                <a:ln>
+                  <a:noFill/>
+                </a:ln>
+                <a:solidFill>
+                  <a:schemeClr val="tx1"/>
+                </a:solidFill>
+                <a:effectLst/>
+                <a:latin typeface="Calibri" pitchFamily="34" charset="0"/>
+                <a:ea typeface="Calibri" pitchFamily="34" charset="0"/>
+                <a:cs typeface="Times New Roman" pitchFamily="18" charset="0"/>
+              </a:rPr>
+              <a:t> Name: 	</a:t>
+            </a:r>
+            <a:endParaRPr kumimoji="0" lang="de-CH" sz="900" b="0" i="0" u="none" strike="noStrike" cap="none" normalizeH="0" baseline="0" dirty="0" smtClean="0">
               <a:ln>
                 <a:noFill/>
               </a:ln>
@@ -7648,24 +7560,16 @@
             </a:endParaRPr>
           </a:p>
           <a:p>
-            <a:pPr marL="0" marR="0" lvl="0" indent="0" algn="l" defTabSz="914400" rtl="0" eaLnBrk="0" fontAlgn="base" latinLnBrk="0" hangingPunct="0">
-              <a:lnSpc>
-                <a:spcPct val="100000"/>
-              </a:lnSpc>
+            <a:pPr lvl="0" defTabSz="914400" eaLnBrk="0" fontAlgn="base" hangingPunct="0">
               <a:spcBef>
                 <a:spcPct val="0"/>
               </a:spcBef>
               <a:spcAft>
                 <a:spcPct val="0"/>
               </a:spcAft>
-              <a:buClrTx/>
-              <a:buSzTx/>
-              <a:buFontTx/>
-              <a:buNone/>
-              <a:tabLst/>
             </a:pPr>
             <a:r>
-              <a:rPr kumimoji="0" lang="de-CH" sz="1100" b="0" i="0" u="none" strike="noStrike" cap="none" normalizeH="0" baseline="0" smtClean="0">
+              <a:rPr kumimoji="0" lang="de-CH" sz="1100" b="0" i="0" u="none" strike="noStrike" cap="none" normalizeH="0" baseline="0" dirty="0" err="1" smtClean="0">
                 <a:ln>
                   <a:noFill/>
                 </a:ln>
@@ -7677,38 +7581,47 @@
                 <a:ea typeface="Calibri" pitchFamily="34" charset="0"/>
                 <a:cs typeface="Times New Roman" pitchFamily="18" charset="0"/>
               </a:rPr>
-              <a:t>Purpose: 	Stellt Informationen über den Patient zur Verfügung welche auf dem Display angezeigt werden können.</a:t>
-            </a:r>
-            <a:endParaRPr kumimoji="0" lang="de-CH" sz="900" b="0" i="0" u="none" strike="noStrike" cap="none" normalizeH="0" baseline="0" smtClean="0">
-              <a:ln>
-                <a:noFill/>
-              </a:ln>
-              <a:solidFill>
-                <a:schemeClr val="tx1"/>
-              </a:solidFill>
-              <a:effectLst/>
-              <a:latin typeface="Arial" pitchFamily="34" charset="0"/>
-              <a:cs typeface="Arial" pitchFamily="34" charset="0"/>
-            </a:endParaRPr>
-          </a:p>
-          <a:p>
-            <a:pPr marL="0" marR="0" lvl="0" indent="0" algn="l" defTabSz="914400" rtl="0" eaLnBrk="0" fontAlgn="base" latinLnBrk="0" hangingPunct="0">
-              <a:lnSpc>
-                <a:spcPct val="100000"/>
-              </a:lnSpc>
-              <a:spcBef>
-                <a:spcPct val="0"/>
-              </a:spcBef>
-              <a:spcAft>
-                <a:spcPct val="0"/>
-              </a:spcAft>
-              <a:buClrTx/>
-              <a:buSzTx/>
-              <a:buFontTx/>
-              <a:buNone/>
-              <a:tabLst/>
-            </a:pPr>
-            <a:endParaRPr kumimoji="0" lang="de-CH" sz="1800" b="0" i="0" u="none" strike="noStrike" cap="none" normalizeH="0" baseline="0" smtClean="0">
+              <a:t>Purpose</a:t>
+            </a:r>
+            <a:r>
+              <a:rPr kumimoji="0" lang="de-CH" sz="1100" b="0" i="0" u="none" strike="noStrike" cap="none" normalizeH="0" baseline="0" dirty="0" smtClean="0">
+                <a:ln>
+                  <a:noFill/>
+                </a:ln>
+                <a:solidFill>
+                  <a:schemeClr val="tx1"/>
+                </a:solidFill>
+                <a:effectLst/>
+                <a:latin typeface="Calibri" pitchFamily="34" charset="0"/>
+                <a:ea typeface="Calibri" pitchFamily="34" charset="0"/>
+                <a:cs typeface="Times New Roman" pitchFamily="18" charset="0"/>
+              </a:rPr>
+              <a:t>: 	</a:t>
+            </a:r>
+            <a:r>
+              <a:rPr kumimoji="0" lang="de-CH" sz="1100" b="0" i="0" u="none" strike="noStrike" cap="none" normalizeH="0" baseline="0" dirty="0" smtClean="0">
+                <a:ln>
+                  <a:noFill/>
+                </a:ln>
+                <a:solidFill>
+                  <a:schemeClr val="tx1"/>
+                </a:solidFill>
+                <a:effectLst/>
+                <a:latin typeface="Calibri" pitchFamily="34" charset="0"/>
+                <a:ea typeface="Calibri" pitchFamily="34" charset="0"/>
+                <a:cs typeface="Times New Roman" pitchFamily="18" charset="0"/>
+              </a:rPr>
+              <a:t>	</a:t>
+            </a:r>
+            <a:r>
+              <a:rPr lang="de-CH" sz="1100" dirty="0" smtClean="0"/>
+              <a:t>Kommuniziert </a:t>
+            </a:r>
+            <a:r>
+              <a:rPr lang="de-CH" sz="1100" dirty="0"/>
+              <a:t>mit Applikationsserver, erstellt Anfragen und empfängt Antworten des Servers</a:t>
+            </a:r>
+            <a:endParaRPr kumimoji="0" lang="de-CH" sz="1800" b="0" i="0" u="none" strike="noStrike" cap="none" normalizeH="0" baseline="0" dirty="0" smtClean="0">
               <a:ln>
                 <a:noFill/>
               </a:ln>
@@ -7775,657 +7688,59 @@
           <a:lstStyle/>
           <a:p>
             <a:r>
-              <a:rPr lang="en-GB" dirty="0" smtClean="0"/>
-              <a:t>CRC-Card - GUI</a:t>
-            </a:r>
-            <a:endParaRPr lang="en-GB" dirty="0"/>
-          </a:p>
-        </p:txBody>
-      </p:sp>
-      <p:graphicFrame>
-        <p:nvGraphicFramePr>
-          <p:cNvPr id="3" name="Tabelle 2"/>
-          <p:cNvGraphicFramePr>
-            <a:graphicFrameLocks noGrp="1"/>
-          </p:cNvGraphicFramePr>
-          <p:nvPr>
-            <p:extLst>
-              <p:ext uri="{D42A27DB-BD31-4B8C-83A1-F6EECF244321}">
-                <p14:modId xmlns:p14="http://schemas.microsoft.com/office/powerpoint/2010/main" val="4235992484"/>
-              </p:ext>
-            </p:extLst>
-          </p:nvPr>
-        </p:nvGraphicFramePr>
-        <p:xfrm>
-          <a:off x="2051050" y="3910965"/>
-          <a:ext cx="5849620" cy="1927860"/>
-        </p:xfrm>
-        <a:graphic>
-          <a:graphicData uri="http://schemas.openxmlformats.org/drawingml/2006/table">
-            <a:tbl>
-              <a:tblPr firstRow="1" firstCol="1" bandRow="1">
-                <a:tableStyleId>{5C22544A-7EE6-4342-B048-85BDC9FD1C3A}</a:tableStyleId>
-              </a:tblPr>
-              <a:tblGrid>
-                <a:gridCol w="2924810"/>
-                <a:gridCol w="2924810"/>
-              </a:tblGrid>
-              <a:tr h="0">
-                <a:tc>
-                  <a:txBody>
-                    <a:bodyPr/>
-                    <a:lstStyle/>
-                    <a:p>
-                      <a:pPr>
-                        <a:lnSpc>
-                          <a:spcPct val="115000"/>
-                        </a:lnSpc>
-                        <a:spcAft>
-                          <a:spcPts val="0"/>
-                        </a:spcAft>
-                      </a:pPr>
-                      <a:r>
-                        <a:rPr lang="de-CH" sz="1100">
-                          <a:effectLst/>
-                        </a:rPr>
-                        <a:t>Responsibilities: </a:t>
-                      </a:r>
-                      <a:endParaRPr lang="de-CH" sz="1100">
-                        <a:effectLst/>
-                        <a:latin typeface="Calibri"/>
-                        <a:ea typeface="Calibri"/>
-                        <a:cs typeface="Times New Roman"/>
-                      </a:endParaRPr>
-                    </a:p>
-                  </a:txBody>
-                  <a:tcPr marL="68580" marR="68580" marT="0" marB="0"/>
-                </a:tc>
-                <a:tc>
-                  <a:txBody>
-                    <a:bodyPr/>
-                    <a:lstStyle/>
-                    <a:p>
-                      <a:pPr>
-                        <a:lnSpc>
-                          <a:spcPct val="115000"/>
-                        </a:lnSpc>
-                        <a:spcAft>
-                          <a:spcPts val="0"/>
-                        </a:spcAft>
-                      </a:pPr>
-                      <a:r>
-                        <a:rPr lang="de-CH" sz="1100">
-                          <a:effectLst/>
-                        </a:rPr>
-                        <a:t>Collaborations: </a:t>
-                      </a:r>
-                      <a:endParaRPr lang="de-CH" sz="1100">
-                        <a:effectLst/>
-                        <a:latin typeface="Calibri"/>
-                        <a:ea typeface="Calibri"/>
-                        <a:cs typeface="Times New Roman"/>
-                      </a:endParaRPr>
-                    </a:p>
-                  </a:txBody>
-                  <a:tcPr marL="68580" marR="68580" marT="0" marB="0"/>
-                </a:tc>
-              </a:tr>
-              <a:tr h="0">
-                <a:tc>
-                  <a:txBody>
-                    <a:bodyPr/>
-                    <a:lstStyle/>
-                    <a:p>
-                      <a:pPr>
-                        <a:lnSpc>
-                          <a:spcPct val="115000"/>
-                        </a:lnSpc>
-                        <a:spcAft>
-                          <a:spcPts val="0"/>
-                        </a:spcAft>
-                      </a:pPr>
-                      <a:r>
-                        <a:rPr lang="de-CH" sz="1100">
-                          <a:effectLst/>
-                        </a:rPr>
-                        <a:t>Kennt Dokument Eigenschaften</a:t>
-                      </a:r>
-                      <a:endParaRPr lang="de-CH" sz="1100">
-                        <a:effectLst/>
-                        <a:latin typeface="Calibri"/>
-                        <a:ea typeface="Calibri"/>
-                        <a:cs typeface="Times New Roman"/>
-                      </a:endParaRPr>
-                    </a:p>
-                  </a:txBody>
-                  <a:tcPr marL="68580" marR="68580" marT="0" marB="0"/>
-                </a:tc>
-                <a:tc>
-                  <a:txBody>
-                    <a:bodyPr/>
-                    <a:lstStyle/>
-                    <a:p>
-                      <a:pPr>
-                        <a:lnSpc>
-                          <a:spcPct val="115000"/>
-                        </a:lnSpc>
-                        <a:spcAft>
-                          <a:spcPts val="0"/>
-                        </a:spcAft>
-                      </a:pPr>
-                      <a:r>
-                        <a:rPr lang="de-CH" sz="1100">
-                          <a:effectLst/>
-                        </a:rPr>
-                        <a:t> </a:t>
-                      </a:r>
-                      <a:endParaRPr lang="de-CH" sz="1100">
-                        <a:effectLst/>
-                        <a:latin typeface="Calibri"/>
-                        <a:ea typeface="Calibri"/>
-                        <a:cs typeface="Times New Roman"/>
-                      </a:endParaRPr>
-                    </a:p>
-                  </a:txBody>
-                  <a:tcPr marL="68580" marR="68580" marT="0" marB="0"/>
-                </a:tc>
-              </a:tr>
-              <a:tr h="0">
-                <a:tc>
-                  <a:txBody>
-                    <a:bodyPr/>
-                    <a:lstStyle/>
-                    <a:p>
-                      <a:pPr>
-                        <a:lnSpc>
-                          <a:spcPct val="115000"/>
-                        </a:lnSpc>
-                        <a:spcAft>
-                          <a:spcPts val="0"/>
-                        </a:spcAft>
-                      </a:pPr>
-                      <a:r>
-                        <a:rPr lang="de-CH" sz="1100">
-                          <a:effectLst/>
-                        </a:rPr>
-                        <a:t> </a:t>
-                      </a:r>
-                      <a:endParaRPr lang="de-CH" sz="1100">
-                        <a:effectLst/>
-                        <a:latin typeface="Calibri"/>
-                        <a:ea typeface="Calibri"/>
-                        <a:cs typeface="Times New Roman"/>
-                      </a:endParaRPr>
-                    </a:p>
-                  </a:txBody>
-                  <a:tcPr marL="68580" marR="68580" marT="0" marB="0"/>
-                </a:tc>
-                <a:tc>
-                  <a:txBody>
-                    <a:bodyPr/>
-                    <a:lstStyle/>
-                    <a:p>
-                      <a:pPr>
-                        <a:lnSpc>
-                          <a:spcPct val="115000"/>
-                        </a:lnSpc>
-                        <a:spcAft>
-                          <a:spcPts val="0"/>
-                        </a:spcAft>
-                      </a:pPr>
-                      <a:r>
-                        <a:rPr lang="de-CH" sz="1100">
-                          <a:effectLst/>
-                        </a:rPr>
-                        <a:t> </a:t>
-                      </a:r>
-                      <a:endParaRPr lang="de-CH" sz="1100">
-                        <a:effectLst/>
-                        <a:latin typeface="Calibri"/>
-                        <a:ea typeface="Calibri"/>
-                        <a:cs typeface="Times New Roman"/>
-                      </a:endParaRPr>
-                    </a:p>
-                  </a:txBody>
-                  <a:tcPr marL="68580" marR="68580" marT="0" marB="0"/>
-                </a:tc>
-              </a:tr>
-              <a:tr h="0">
-                <a:tc>
-                  <a:txBody>
-                    <a:bodyPr/>
-                    <a:lstStyle/>
-                    <a:p>
-                      <a:pPr>
-                        <a:lnSpc>
-                          <a:spcPct val="115000"/>
-                        </a:lnSpc>
-                        <a:spcAft>
-                          <a:spcPts val="0"/>
-                        </a:spcAft>
-                      </a:pPr>
-                      <a:r>
-                        <a:rPr lang="de-CH" sz="1100">
-                          <a:effectLst/>
-                        </a:rPr>
-                        <a:t> </a:t>
-                      </a:r>
-                      <a:endParaRPr lang="de-CH" sz="1100">
-                        <a:effectLst/>
-                        <a:latin typeface="Calibri"/>
-                        <a:ea typeface="Calibri"/>
-                        <a:cs typeface="Times New Roman"/>
-                      </a:endParaRPr>
-                    </a:p>
-                  </a:txBody>
-                  <a:tcPr marL="68580" marR="68580" marT="0" marB="0"/>
-                </a:tc>
-                <a:tc>
-                  <a:txBody>
-                    <a:bodyPr/>
-                    <a:lstStyle/>
-                    <a:p>
-                      <a:pPr>
-                        <a:lnSpc>
-                          <a:spcPct val="115000"/>
-                        </a:lnSpc>
-                        <a:spcAft>
-                          <a:spcPts val="0"/>
-                        </a:spcAft>
-                      </a:pPr>
-                      <a:r>
-                        <a:rPr lang="de-CH" sz="1100">
-                          <a:effectLst/>
-                        </a:rPr>
-                        <a:t> </a:t>
-                      </a:r>
-                      <a:endParaRPr lang="de-CH" sz="1100">
-                        <a:effectLst/>
-                        <a:latin typeface="Calibri"/>
-                        <a:ea typeface="Calibri"/>
-                        <a:cs typeface="Times New Roman"/>
-                      </a:endParaRPr>
-                    </a:p>
-                  </a:txBody>
-                  <a:tcPr marL="68580" marR="68580" marT="0" marB="0"/>
-                </a:tc>
-              </a:tr>
-              <a:tr h="0">
-                <a:tc>
-                  <a:txBody>
-                    <a:bodyPr/>
-                    <a:lstStyle/>
-                    <a:p>
-                      <a:pPr>
-                        <a:lnSpc>
-                          <a:spcPct val="115000"/>
-                        </a:lnSpc>
-                        <a:spcAft>
-                          <a:spcPts val="0"/>
-                        </a:spcAft>
-                      </a:pPr>
-                      <a:r>
-                        <a:rPr lang="de-CH" sz="1100">
-                          <a:effectLst/>
-                        </a:rPr>
-                        <a:t> </a:t>
-                      </a:r>
-                      <a:endParaRPr lang="de-CH" sz="1100">
-                        <a:effectLst/>
-                        <a:latin typeface="Calibri"/>
-                        <a:ea typeface="Calibri"/>
-                        <a:cs typeface="Times New Roman"/>
-                      </a:endParaRPr>
-                    </a:p>
-                  </a:txBody>
-                  <a:tcPr marL="68580" marR="68580" marT="0" marB="0"/>
-                </a:tc>
-                <a:tc>
-                  <a:txBody>
-                    <a:bodyPr/>
-                    <a:lstStyle/>
-                    <a:p>
-                      <a:pPr>
-                        <a:lnSpc>
-                          <a:spcPct val="115000"/>
-                        </a:lnSpc>
-                        <a:spcAft>
-                          <a:spcPts val="0"/>
-                        </a:spcAft>
-                      </a:pPr>
-                      <a:r>
-                        <a:rPr lang="de-CH" sz="1100">
-                          <a:effectLst/>
-                        </a:rPr>
-                        <a:t> </a:t>
-                      </a:r>
-                      <a:endParaRPr lang="de-CH" sz="1100">
-                        <a:effectLst/>
-                        <a:latin typeface="Calibri"/>
-                        <a:ea typeface="Calibri"/>
-                        <a:cs typeface="Times New Roman"/>
-                      </a:endParaRPr>
-                    </a:p>
-                  </a:txBody>
-                  <a:tcPr marL="68580" marR="68580" marT="0" marB="0"/>
-                </a:tc>
-              </a:tr>
-              <a:tr h="0">
-                <a:tc>
-                  <a:txBody>
-                    <a:bodyPr/>
-                    <a:lstStyle/>
-                    <a:p>
-                      <a:pPr>
-                        <a:lnSpc>
-                          <a:spcPct val="115000"/>
-                        </a:lnSpc>
-                        <a:spcAft>
-                          <a:spcPts val="0"/>
-                        </a:spcAft>
-                      </a:pPr>
-                      <a:r>
-                        <a:rPr lang="de-CH" sz="1100">
-                          <a:effectLst/>
-                        </a:rPr>
-                        <a:t> </a:t>
-                      </a:r>
-                      <a:endParaRPr lang="de-CH" sz="1100">
-                        <a:effectLst/>
-                        <a:latin typeface="Calibri"/>
-                        <a:ea typeface="Calibri"/>
-                        <a:cs typeface="Times New Roman"/>
-                      </a:endParaRPr>
-                    </a:p>
-                  </a:txBody>
-                  <a:tcPr marL="68580" marR="68580" marT="0" marB="0"/>
-                </a:tc>
-                <a:tc>
-                  <a:txBody>
-                    <a:bodyPr/>
-                    <a:lstStyle/>
-                    <a:p>
-                      <a:pPr>
-                        <a:lnSpc>
-                          <a:spcPct val="115000"/>
-                        </a:lnSpc>
-                        <a:spcAft>
-                          <a:spcPts val="0"/>
-                        </a:spcAft>
-                      </a:pPr>
-                      <a:r>
-                        <a:rPr lang="de-CH" sz="1100">
-                          <a:effectLst/>
-                        </a:rPr>
-                        <a:t> </a:t>
-                      </a:r>
-                      <a:endParaRPr lang="de-CH" sz="1100">
-                        <a:effectLst/>
-                        <a:latin typeface="Calibri"/>
-                        <a:ea typeface="Calibri"/>
-                        <a:cs typeface="Times New Roman"/>
-                      </a:endParaRPr>
-                    </a:p>
-                  </a:txBody>
-                  <a:tcPr marL="68580" marR="68580" marT="0" marB="0"/>
-                </a:tc>
-              </a:tr>
-              <a:tr h="0">
-                <a:tc>
-                  <a:txBody>
-                    <a:bodyPr/>
-                    <a:lstStyle/>
-                    <a:p>
-                      <a:pPr>
-                        <a:lnSpc>
-                          <a:spcPct val="115000"/>
-                        </a:lnSpc>
-                        <a:spcAft>
-                          <a:spcPts val="0"/>
-                        </a:spcAft>
-                      </a:pPr>
-                      <a:r>
-                        <a:rPr lang="de-CH" sz="1100">
-                          <a:effectLst/>
-                        </a:rPr>
-                        <a:t> </a:t>
-                      </a:r>
-                      <a:endParaRPr lang="de-CH" sz="1100">
-                        <a:effectLst/>
-                        <a:latin typeface="Calibri"/>
-                        <a:ea typeface="Calibri"/>
-                        <a:cs typeface="Times New Roman"/>
-                      </a:endParaRPr>
-                    </a:p>
-                  </a:txBody>
-                  <a:tcPr marL="68580" marR="68580" marT="0" marB="0"/>
-                </a:tc>
-                <a:tc>
-                  <a:txBody>
-                    <a:bodyPr/>
-                    <a:lstStyle/>
-                    <a:p>
-                      <a:pPr>
-                        <a:lnSpc>
-                          <a:spcPct val="115000"/>
-                        </a:lnSpc>
-                        <a:spcAft>
-                          <a:spcPts val="0"/>
-                        </a:spcAft>
-                      </a:pPr>
-                      <a:r>
-                        <a:rPr lang="de-CH" sz="1100">
-                          <a:effectLst/>
-                        </a:rPr>
-                        <a:t> </a:t>
-                      </a:r>
-                      <a:endParaRPr lang="de-CH" sz="1100">
-                        <a:effectLst/>
-                        <a:latin typeface="Calibri"/>
-                        <a:ea typeface="Calibri"/>
-                        <a:cs typeface="Times New Roman"/>
-                      </a:endParaRPr>
-                    </a:p>
-                  </a:txBody>
-                  <a:tcPr marL="68580" marR="68580" marT="0" marB="0"/>
-                </a:tc>
-              </a:tr>
-              <a:tr h="0">
-                <a:tc>
-                  <a:txBody>
-                    <a:bodyPr/>
-                    <a:lstStyle/>
-                    <a:p>
-                      <a:pPr>
-                        <a:lnSpc>
-                          <a:spcPct val="115000"/>
-                        </a:lnSpc>
-                        <a:spcAft>
-                          <a:spcPts val="0"/>
-                        </a:spcAft>
-                      </a:pPr>
-                      <a:r>
-                        <a:rPr lang="de-CH" sz="1100">
-                          <a:effectLst/>
-                        </a:rPr>
-                        <a:t> </a:t>
-                      </a:r>
-                      <a:endParaRPr lang="de-CH" sz="1100">
-                        <a:effectLst/>
-                        <a:latin typeface="Calibri"/>
-                        <a:ea typeface="Calibri"/>
-                        <a:cs typeface="Times New Roman"/>
-                      </a:endParaRPr>
-                    </a:p>
-                  </a:txBody>
-                  <a:tcPr marL="68580" marR="68580" marT="0" marB="0"/>
-                </a:tc>
-                <a:tc>
-                  <a:txBody>
-                    <a:bodyPr/>
-                    <a:lstStyle/>
-                    <a:p>
-                      <a:pPr>
-                        <a:lnSpc>
-                          <a:spcPct val="115000"/>
-                        </a:lnSpc>
-                        <a:spcAft>
-                          <a:spcPts val="0"/>
-                        </a:spcAft>
-                      </a:pPr>
-                      <a:r>
-                        <a:rPr lang="de-CH" sz="1100">
-                          <a:effectLst/>
-                        </a:rPr>
-                        <a:t> </a:t>
-                      </a:r>
-                      <a:endParaRPr lang="de-CH" sz="1100">
-                        <a:effectLst/>
-                        <a:latin typeface="Calibri"/>
-                        <a:ea typeface="Calibri"/>
-                        <a:cs typeface="Times New Roman"/>
-                      </a:endParaRPr>
-                    </a:p>
-                  </a:txBody>
-                  <a:tcPr marL="68580" marR="68580" marT="0" marB="0"/>
-                </a:tc>
-              </a:tr>
-              <a:tr h="0">
-                <a:tc>
-                  <a:txBody>
-                    <a:bodyPr/>
-                    <a:lstStyle/>
-                    <a:p>
-                      <a:pPr>
-                        <a:lnSpc>
-                          <a:spcPct val="115000"/>
-                        </a:lnSpc>
-                        <a:spcAft>
-                          <a:spcPts val="0"/>
-                        </a:spcAft>
-                      </a:pPr>
-                      <a:r>
-                        <a:rPr lang="de-CH" sz="1100">
-                          <a:effectLst/>
-                        </a:rPr>
-                        <a:t> </a:t>
-                      </a:r>
-                      <a:endParaRPr lang="de-CH" sz="1100">
-                        <a:effectLst/>
-                        <a:latin typeface="Calibri"/>
-                        <a:ea typeface="Calibri"/>
-                        <a:cs typeface="Times New Roman"/>
-                      </a:endParaRPr>
-                    </a:p>
-                  </a:txBody>
-                  <a:tcPr marL="68580" marR="68580" marT="0" marB="0"/>
-                </a:tc>
-                <a:tc>
-                  <a:txBody>
-                    <a:bodyPr/>
-                    <a:lstStyle/>
-                    <a:p>
-                      <a:pPr>
-                        <a:lnSpc>
-                          <a:spcPct val="115000"/>
-                        </a:lnSpc>
-                        <a:spcAft>
-                          <a:spcPts val="0"/>
-                        </a:spcAft>
-                      </a:pPr>
-                      <a:r>
-                        <a:rPr lang="de-CH" sz="1100">
-                          <a:effectLst/>
-                        </a:rPr>
-                        <a:t> </a:t>
-                      </a:r>
-                      <a:endParaRPr lang="de-CH" sz="1100">
-                        <a:effectLst/>
-                        <a:latin typeface="Calibri"/>
-                        <a:ea typeface="Calibri"/>
-                        <a:cs typeface="Times New Roman"/>
-                      </a:endParaRPr>
-                    </a:p>
-                  </a:txBody>
-                  <a:tcPr marL="68580" marR="68580" marT="0" marB="0"/>
-                </a:tc>
-              </a:tr>
-              <a:tr h="0">
-                <a:tc>
-                  <a:txBody>
-                    <a:bodyPr/>
-                    <a:lstStyle/>
-                    <a:p>
-                      <a:pPr>
-                        <a:lnSpc>
-                          <a:spcPct val="115000"/>
-                        </a:lnSpc>
-                        <a:spcAft>
-                          <a:spcPts val="0"/>
-                        </a:spcAft>
-                      </a:pPr>
-                      <a:r>
-                        <a:rPr lang="de-CH" sz="1100">
-                          <a:effectLst/>
-                        </a:rPr>
-                        <a:t> </a:t>
-                      </a:r>
-                      <a:endParaRPr lang="de-CH" sz="1100">
-                        <a:effectLst/>
-                        <a:latin typeface="Calibri"/>
-                        <a:ea typeface="Calibri"/>
-                        <a:cs typeface="Times New Roman"/>
-                      </a:endParaRPr>
-                    </a:p>
-                  </a:txBody>
-                  <a:tcPr marL="68580" marR="68580" marT="0" marB="0"/>
-                </a:tc>
-                <a:tc>
-                  <a:txBody>
-                    <a:bodyPr/>
-                    <a:lstStyle/>
-                    <a:p>
-                      <a:pPr>
-                        <a:lnSpc>
-                          <a:spcPct val="115000"/>
-                        </a:lnSpc>
-                        <a:spcAft>
-                          <a:spcPts val="0"/>
-                        </a:spcAft>
-                      </a:pPr>
-                      <a:r>
-                        <a:rPr lang="de-CH" sz="1100" dirty="0">
-                          <a:effectLst/>
-                        </a:rPr>
-                        <a:t> </a:t>
-                      </a:r>
-                      <a:endParaRPr lang="de-CH" sz="1100" dirty="0">
-                        <a:effectLst/>
-                        <a:latin typeface="Calibri"/>
-                        <a:ea typeface="Calibri"/>
-                        <a:cs typeface="Times New Roman"/>
-                      </a:endParaRPr>
-                    </a:p>
-                  </a:txBody>
-                  <a:tcPr marL="68580" marR="68580" marT="0" marB="0"/>
-                </a:tc>
-              </a:tr>
-            </a:tbl>
-          </a:graphicData>
-        </a:graphic>
-      </p:graphicFrame>
-      <p:sp>
-        <p:nvSpPr>
-          <p:cNvPr id="5" name="Rectangle 1"/>
-          <p:cNvSpPr>
-            <a:spLocks noChangeArrowheads="1"/>
-          </p:cNvSpPr>
+              <a:rPr lang="de-CH" dirty="0" smtClean="0"/>
+              <a:t>Detailansicht </a:t>
+            </a:r>
+            <a:r>
+              <a:rPr lang="de-CH" dirty="0" err="1" smtClean="0"/>
+              <a:t>ServerKommunikationsklasse</a:t>
+            </a:r>
+            <a:endParaRPr lang="de-CH" dirty="0"/>
+          </a:p>
+        </p:txBody>
+      </p:sp>
+      <p:pic>
+        <p:nvPicPr>
+          <p:cNvPr id="3074" name="Picture 2"/>
+          <p:cNvPicPr>
+            <a:picLocks noChangeAspect="1" noChangeArrowheads="1"/>
+          </p:cNvPicPr>
           <p:nvPr/>
-        </p:nvSpPr>
+        </p:nvPicPr>
+        <p:blipFill>
+          <a:blip r:embed="rId2">
+            <a:clrChange>
+              <a:clrFrom>
+                <a:srgbClr val="FFFFFF"/>
+              </a:clrFrom>
+              <a:clrTo>
+                <a:srgbClr val="FFFFFF">
+                  <a:alpha val="0"/>
+                </a:srgbClr>
+              </a:clrTo>
+            </a:clrChange>
+            <a:duotone>
+              <a:prstClr val="black"/>
+              <a:schemeClr val="accent1">
+                <a:tint val="45000"/>
+                <a:satMod val="400000"/>
+              </a:schemeClr>
+            </a:duotone>
+            <a:extLst>
+              <a:ext uri="{28A0092B-C50C-407E-A947-70E740481C1C}">
+                <a14:useLocalDpi xmlns:a14="http://schemas.microsoft.com/office/drawing/2010/main" val="0"/>
+              </a:ext>
+            </a:extLst>
+          </a:blip>
+          <a:srcRect/>
+          <a:stretch>
+            <a:fillRect/>
+          </a:stretch>
+        </p:blipFill>
         <p:spPr bwMode="auto">
           <a:xfrm>
-            <a:off x="2051050" y="3136900"/>
-            <a:ext cx="12192000" cy="457200"/>
+            <a:off x="984107" y="2184687"/>
+            <a:ext cx="8243021" cy="2333979"/>
           </a:xfrm>
           <a:prstGeom prst="rect">
             <a:avLst/>
@@ -8434,7 +7749,6 @@
           <a:ln>
             <a:noFill/>
           </a:ln>
-          <a:effectLst/>
           <a:extLst>
             <a:ext uri="{909E8E84-426E-40DD-AFC4-6F175D3DCCD1}">
               <a14:hiddenFill xmlns:a14="http://schemas.microsoft.com/office/drawing/2010/main">
@@ -8453,236 +7767,13 @@
                 <a:tailEnd/>
               </a14:hiddenLine>
             </a:ext>
-            <a:ext uri="{AF507438-7753-43E0-B8FC-AC1667EBCBE1}">
-              <a14:hiddenEffects xmlns:a14="http://schemas.microsoft.com/office/drawing/2010/main">
-                <a:effectLst>
-                  <a:outerShdw dist="35921" dir="2700000" algn="ctr" rotWithShape="0">
-                    <a:schemeClr val="bg2"/>
-                  </a:outerShdw>
-                </a:effectLst>
-              </a14:hiddenEffects>
-            </a:ext>
           </a:extLst>
         </p:spPr>
-        <p:txBody>
-          <a:bodyPr vert="horz" wrap="none" lIns="91440" tIns="45720" rIns="91440" bIns="45720" numCol="1" anchor="ctr" anchorCtr="0" compatLnSpc="1">
-            <a:prstTxWarp prst="textNoShape">
-              <a:avLst/>
-            </a:prstTxWarp>
-            <a:spAutoFit/>
-          </a:bodyPr>
-          <a:lstStyle/>
-          <a:p>
-            <a:pPr marL="0" marR="0" lvl="0" indent="0" algn="l" defTabSz="914400" rtl="0" eaLnBrk="1" fontAlgn="base" latinLnBrk="0" hangingPunct="1">
-              <a:lnSpc>
-                <a:spcPct val="100000"/>
-              </a:lnSpc>
-              <a:spcBef>
-                <a:spcPct val="0"/>
-              </a:spcBef>
-              <a:spcAft>
-                <a:spcPct val="0"/>
-              </a:spcAft>
-              <a:buClrTx/>
-              <a:buSzTx/>
-              <a:buFontTx/>
-              <a:buNone/>
-              <a:tabLst/>
-            </a:pPr>
-            <a:r>
-              <a:rPr kumimoji="0" lang="en-US" sz="1100" b="0" i="0" u="none" strike="noStrike" cap="none" normalizeH="0" baseline="0" smtClean="0">
-                <a:ln>
-                  <a:noFill/>
-                </a:ln>
-                <a:solidFill>
-                  <a:schemeClr val="tx1"/>
-                </a:solidFill>
-                <a:effectLst/>
-                <a:latin typeface="Calibri" pitchFamily="34" charset="0"/>
-                <a:ea typeface="Calibri" pitchFamily="34" charset="0"/>
-                <a:cs typeface="Times New Roman" pitchFamily="18" charset="0"/>
-              </a:rPr>
-              <a:t>Working Name:		Dokument</a:t>
-            </a:r>
-            <a:endParaRPr kumimoji="0" lang="de-CH" sz="900" b="0" i="0" u="none" strike="noStrike" cap="none" normalizeH="0" baseline="0" smtClean="0">
-              <a:ln>
-                <a:noFill/>
-              </a:ln>
-              <a:solidFill>
-                <a:schemeClr val="tx1"/>
-              </a:solidFill>
-              <a:effectLst/>
-              <a:latin typeface="Arial" pitchFamily="34" charset="0"/>
-              <a:cs typeface="Arial" pitchFamily="34" charset="0"/>
-            </a:endParaRPr>
-          </a:p>
-          <a:p>
-            <a:pPr marL="0" marR="0" lvl="0" indent="0" algn="l" defTabSz="914400" rtl="0" eaLnBrk="0" fontAlgn="base" latinLnBrk="0" hangingPunct="0">
-              <a:lnSpc>
-                <a:spcPct val="100000"/>
-              </a:lnSpc>
-              <a:spcBef>
-                <a:spcPct val="0"/>
-              </a:spcBef>
-              <a:spcAft>
-                <a:spcPct val="0"/>
-              </a:spcAft>
-              <a:buClrTx/>
-              <a:buSzTx/>
-              <a:buFontTx/>
-              <a:buNone/>
-              <a:tabLst/>
-            </a:pPr>
-            <a:r>
-              <a:rPr kumimoji="0" lang="en-US" sz="1100" b="0" i="0" u="none" strike="noStrike" cap="none" normalizeH="0" baseline="0" smtClean="0">
-                <a:ln>
-                  <a:noFill/>
-                </a:ln>
-                <a:solidFill>
-                  <a:schemeClr val="tx1"/>
-                </a:solidFill>
-                <a:effectLst/>
-                <a:latin typeface="Calibri" pitchFamily="34" charset="0"/>
-                <a:ea typeface="Calibri" pitchFamily="34" charset="0"/>
-                <a:cs typeface="Times New Roman" pitchFamily="18" charset="0"/>
-              </a:rPr>
-              <a:t>Possible Names:	</a:t>
-            </a:r>
-            <a:endParaRPr kumimoji="0" lang="de-CH" sz="900" b="0" i="0" u="none" strike="noStrike" cap="none" normalizeH="0" baseline="0" smtClean="0">
-              <a:ln>
-                <a:noFill/>
-              </a:ln>
-              <a:solidFill>
-                <a:schemeClr val="tx1"/>
-              </a:solidFill>
-              <a:effectLst/>
-              <a:latin typeface="Arial" pitchFamily="34" charset="0"/>
-              <a:cs typeface="Arial" pitchFamily="34" charset="0"/>
-            </a:endParaRPr>
-          </a:p>
-          <a:p>
-            <a:pPr marL="0" marR="0" lvl="0" indent="0" algn="l" defTabSz="914400" rtl="0" eaLnBrk="0" fontAlgn="base" latinLnBrk="0" hangingPunct="0">
-              <a:lnSpc>
-                <a:spcPct val="100000"/>
-              </a:lnSpc>
-              <a:spcBef>
-                <a:spcPct val="0"/>
-              </a:spcBef>
-              <a:spcAft>
-                <a:spcPct val="0"/>
-              </a:spcAft>
-              <a:buClrTx/>
-              <a:buSzTx/>
-              <a:buFontTx/>
-              <a:buNone/>
-              <a:tabLst/>
-            </a:pPr>
-            <a:r>
-              <a:rPr kumimoji="0" lang="en-US" sz="1100" b="0" i="0" u="none" strike="noStrike" cap="none" normalizeH="0" baseline="0" smtClean="0">
-                <a:ln>
-                  <a:noFill/>
-                </a:ln>
-                <a:solidFill>
-                  <a:schemeClr val="tx1"/>
-                </a:solidFill>
-                <a:effectLst/>
-                <a:latin typeface="Calibri" pitchFamily="34" charset="0"/>
-                <a:ea typeface="Calibri" pitchFamily="34" charset="0"/>
-                <a:cs typeface="Times New Roman" pitchFamily="18" charset="0"/>
-              </a:rPr>
-              <a:t>Effecitve Name: 	</a:t>
-            </a:r>
-            <a:endParaRPr kumimoji="0" lang="de-CH" sz="900" b="0" i="0" u="none" strike="noStrike" cap="none" normalizeH="0" baseline="0" smtClean="0">
-              <a:ln>
-                <a:noFill/>
-              </a:ln>
-              <a:solidFill>
-                <a:schemeClr val="tx1"/>
-              </a:solidFill>
-              <a:effectLst/>
-              <a:latin typeface="Arial" pitchFamily="34" charset="0"/>
-              <a:cs typeface="Arial" pitchFamily="34" charset="0"/>
-            </a:endParaRPr>
-          </a:p>
-          <a:p>
-            <a:pPr marL="0" marR="0" lvl="0" indent="0" algn="l" defTabSz="914400" rtl="0" eaLnBrk="0" fontAlgn="base" latinLnBrk="0" hangingPunct="0">
-              <a:lnSpc>
-                <a:spcPct val="100000"/>
-              </a:lnSpc>
-              <a:spcBef>
-                <a:spcPct val="0"/>
-              </a:spcBef>
-              <a:spcAft>
-                <a:spcPct val="0"/>
-              </a:spcAft>
-              <a:buClrTx/>
-              <a:buSzTx/>
-              <a:buFontTx/>
-              <a:buNone/>
-              <a:tabLst/>
-            </a:pPr>
-            <a:r>
-              <a:rPr kumimoji="0" lang="de-CH" sz="1100" b="0" i="0" u="none" strike="noStrike" cap="none" normalizeH="0" baseline="0" smtClean="0">
-                <a:ln>
-                  <a:noFill/>
-                </a:ln>
-                <a:solidFill>
-                  <a:schemeClr val="tx1"/>
-                </a:solidFill>
-                <a:effectLst/>
-                <a:latin typeface="Calibri" pitchFamily="34" charset="0"/>
-                <a:ea typeface="Calibri" pitchFamily="34" charset="0"/>
-                <a:cs typeface="Times New Roman" pitchFamily="18" charset="0"/>
-              </a:rPr>
-              <a:t>Purpose: 	Stellt Informationen über den Patient zur Verfügung welche auf dem Display angezeigt werden können.</a:t>
-            </a:r>
-            <a:endParaRPr kumimoji="0" lang="de-CH" sz="900" b="0" i="0" u="none" strike="noStrike" cap="none" normalizeH="0" baseline="0" smtClean="0">
-              <a:ln>
-                <a:noFill/>
-              </a:ln>
-              <a:solidFill>
-                <a:schemeClr val="tx1"/>
-              </a:solidFill>
-              <a:effectLst/>
-              <a:latin typeface="Arial" pitchFamily="34" charset="0"/>
-              <a:cs typeface="Arial" pitchFamily="34" charset="0"/>
-            </a:endParaRPr>
-          </a:p>
-          <a:p>
-            <a:pPr marL="0" marR="0" lvl="0" indent="0" algn="l" defTabSz="914400" rtl="0" eaLnBrk="0" fontAlgn="base" latinLnBrk="0" hangingPunct="0">
-              <a:lnSpc>
-                <a:spcPct val="100000"/>
-              </a:lnSpc>
-              <a:spcBef>
-                <a:spcPct val="0"/>
-              </a:spcBef>
-              <a:spcAft>
-                <a:spcPct val="0"/>
-              </a:spcAft>
-              <a:buClrTx/>
-              <a:buSzTx/>
-              <a:buFontTx/>
-              <a:buNone/>
-              <a:tabLst/>
-            </a:pPr>
-            <a:endParaRPr kumimoji="0" lang="de-CH" sz="1800" b="0" i="0" u="none" strike="noStrike" cap="none" normalizeH="0" baseline="0" smtClean="0">
-              <a:ln>
-                <a:noFill/>
-              </a:ln>
-              <a:solidFill>
-                <a:schemeClr val="tx1"/>
-              </a:solidFill>
-              <a:effectLst/>
-              <a:latin typeface="Arial" pitchFamily="34" charset="0"/>
-              <a:cs typeface="Arial" pitchFamily="34" charset="0"/>
-            </a:endParaRPr>
-          </a:p>
-        </p:txBody>
-      </p:sp>
+      </p:pic>
     </p:spTree>
     <p:extLst>
       <p:ext uri="{BB962C8B-B14F-4D97-AF65-F5344CB8AC3E}">
-        <p14:creationId xmlns:p14="http://schemas.microsoft.com/office/powerpoint/2010/main" val="817720675"/>
+        <p14:creationId xmlns:p14="http://schemas.microsoft.com/office/powerpoint/2010/main" val="989284987"/>
       </p:ext>
     </p:extLst>
   </p:cSld>
@@ -8829,81 +7920,6 @@
 </file>
 
 <file path=ppt/slides/slide7.xml><?xml version="1.0" encoding="utf-8"?>
-<p:sld xmlns:a="http://schemas.openxmlformats.org/drawingml/2006/main" xmlns:r="http://schemas.openxmlformats.org/officeDocument/2006/relationships" xmlns:p="http://schemas.openxmlformats.org/presentationml/2006/main">
-  <p:cSld>
-    <p:spTree>
-      <p:nvGrpSpPr>
-        <p:cNvPr id="1" name=""/>
-        <p:cNvGrpSpPr/>
-        <p:nvPr/>
-      </p:nvGrpSpPr>
-      <p:grpSpPr>
-        <a:xfrm>
-          <a:off x="0" y="0"/>
-          <a:ext cx="0" cy="0"/>
-          <a:chOff x="0" y="0"/>
-          <a:chExt cx="0" cy="0"/>
-        </a:xfrm>
-      </p:grpSpPr>
-      <p:sp>
-        <p:nvSpPr>
-          <p:cNvPr id="2" name="Titel 1"/>
-          <p:cNvSpPr>
-            <a:spLocks noGrp="1"/>
-          </p:cNvSpPr>
-          <p:nvPr>
-            <p:ph type="title"/>
-          </p:nvPr>
-        </p:nvSpPr>
-        <p:spPr/>
-        <p:txBody>
-          <a:bodyPr/>
-          <a:lstStyle/>
-          <a:p>
-            <a:endParaRPr lang="de-CH"/>
-          </a:p>
-        </p:txBody>
-      </p:sp>
-      <p:sp>
-        <p:nvSpPr>
-          <p:cNvPr id="3" name="Inhaltsplatzhalter 2"/>
-          <p:cNvSpPr>
-            <a:spLocks noGrp="1"/>
-          </p:cNvSpPr>
-          <p:nvPr>
-            <p:ph idx="1"/>
-          </p:nvPr>
-        </p:nvSpPr>
-        <p:spPr/>
-        <p:txBody>
-          <a:bodyPr/>
-          <a:lstStyle/>
-          <a:p>
-            <a:endParaRPr lang="de-CH"/>
-          </a:p>
-        </p:txBody>
-      </p:sp>
-    </p:spTree>
-    <p:extLst>
-      <p:ext uri="{BB962C8B-B14F-4D97-AF65-F5344CB8AC3E}">
-        <p14:creationId xmlns:p14="http://schemas.microsoft.com/office/powerpoint/2010/main" val="989284987"/>
-      </p:ext>
-    </p:extLst>
-  </p:cSld>
-  <p:clrMapOvr>
-    <a:masterClrMapping/>
-  </p:clrMapOvr>
-  <p:timing>
-    <p:tnLst>
-      <p:par>
-        <p:cTn id="1" dur="indefinite" restart="never" nodeType="tmRoot"/>
-      </p:par>
-    </p:tnLst>
-  </p:timing>
-</p:sld>
-</file>
-
-<file path=ppt/slides/slide8.xml><?xml version="1.0" encoding="utf-8"?>
 <p:sld xmlns:a="http://schemas.openxmlformats.org/drawingml/2006/main" xmlns:r="http://schemas.openxmlformats.org/officeDocument/2006/relationships" xmlns:p="http://schemas.openxmlformats.org/presentationml/2006/main">
   <p:cSld>
     <p:spTree>

</xml_diff>